<commit_message>
Deploying to gh-pages from @ jiaye-wu/jiaye-wu.github.io@034ffa21680e03e95e411e43d8108a771cc559c5 🚀
</commit_message>
<xml_diff>
--- a/assets/img/flags/1x1/cn.pptx
+++ b/assets/img/flags/1x1/cn.pptx
@@ -243,7 +243,7 @@
           <a:p>
             <a:fld id="{12788856-18BD-4943-ACB1-E391CEA2FDEC}" type="datetimeFigureOut">
               <a:rPr lang="LID4096" smtClean="0"/>
-              <a:t>09/08/2024</a:t>
+              <a:t>12/11/2025</a:t>
             </a:fld>
             <a:endParaRPr lang="LID4096"/>
           </a:p>
@@ -413,7 +413,7 @@
           <a:p>
             <a:fld id="{12788856-18BD-4943-ACB1-E391CEA2FDEC}" type="datetimeFigureOut">
               <a:rPr lang="LID4096" smtClean="0"/>
-              <a:t>09/08/2024</a:t>
+              <a:t>12/11/2025</a:t>
             </a:fld>
             <a:endParaRPr lang="LID4096"/>
           </a:p>
@@ -593,7 +593,7 @@
           <a:p>
             <a:fld id="{12788856-18BD-4943-ACB1-E391CEA2FDEC}" type="datetimeFigureOut">
               <a:rPr lang="LID4096" smtClean="0"/>
-              <a:t>09/08/2024</a:t>
+              <a:t>12/11/2025</a:t>
             </a:fld>
             <a:endParaRPr lang="LID4096"/>
           </a:p>
@@ -763,7 +763,7 @@
           <a:p>
             <a:fld id="{12788856-18BD-4943-ACB1-E391CEA2FDEC}" type="datetimeFigureOut">
               <a:rPr lang="LID4096" smtClean="0"/>
-              <a:t>09/08/2024</a:t>
+              <a:t>12/11/2025</a:t>
             </a:fld>
             <a:endParaRPr lang="LID4096"/>
           </a:p>
@@ -1009,7 +1009,7 @@
           <a:p>
             <a:fld id="{12788856-18BD-4943-ACB1-E391CEA2FDEC}" type="datetimeFigureOut">
               <a:rPr lang="LID4096" smtClean="0"/>
-              <a:t>09/08/2024</a:t>
+              <a:t>12/11/2025</a:t>
             </a:fld>
             <a:endParaRPr lang="LID4096"/>
           </a:p>
@@ -1241,7 +1241,7 @@
           <a:p>
             <a:fld id="{12788856-18BD-4943-ACB1-E391CEA2FDEC}" type="datetimeFigureOut">
               <a:rPr lang="LID4096" smtClean="0"/>
-              <a:t>09/08/2024</a:t>
+              <a:t>12/11/2025</a:t>
             </a:fld>
             <a:endParaRPr lang="LID4096"/>
           </a:p>
@@ -1608,7 +1608,7 @@
           <a:p>
             <a:fld id="{12788856-18BD-4943-ACB1-E391CEA2FDEC}" type="datetimeFigureOut">
               <a:rPr lang="LID4096" smtClean="0"/>
-              <a:t>09/08/2024</a:t>
+              <a:t>12/11/2025</a:t>
             </a:fld>
             <a:endParaRPr lang="LID4096"/>
           </a:p>
@@ -1726,7 +1726,7 @@
           <a:p>
             <a:fld id="{12788856-18BD-4943-ACB1-E391CEA2FDEC}" type="datetimeFigureOut">
               <a:rPr lang="LID4096" smtClean="0"/>
-              <a:t>09/08/2024</a:t>
+              <a:t>12/11/2025</a:t>
             </a:fld>
             <a:endParaRPr lang="LID4096"/>
           </a:p>
@@ -1821,7 +1821,7 @@
           <a:p>
             <a:fld id="{12788856-18BD-4943-ACB1-E391CEA2FDEC}" type="datetimeFigureOut">
               <a:rPr lang="LID4096" smtClean="0"/>
-              <a:t>09/08/2024</a:t>
+              <a:t>12/11/2025</a:t>
             </a:fld>
             <a:endParaRPr lang="LID4096"/>
           </a:p>
@@ -2098,7 +2098,7 @@
           <a:p>
             <a:fld id="{12788856-18BD-4943-ACB1-E391CEA2FDEC}" type="datetimeFigureOut">
               <a:rPr lang="LID4096" smtClean="0"/>
-              <a:t>09/08/2024</a:t>
+              <a:t>12/11/2025</a:t>
             </a:fld>
             <a:endParaRPr lang="LID4096"/>
           </a:p>
@@ -2355,7 +2355,7 @@
           <a:p>
             <a:fld id="{12788856-18BD-4943-ACB1-E391CEA2FDEC}" type="datetimeFigureOut">
               <a:rPr lang="LID4096" smtClean="0"/>
-              <a:t>09/08/2024</a:t>
+              <a:t>12/11/2025</a:t>
             </a:fld>
             <a:endParaRPr lang="LID4096"/>
           </a:p>
@@ -2568,7 +2568,7 @@
           <a:p>
             <a:fld id="{12788856-18BD-4943-ACB1-E391CEA2FDEC}" type="datetimeFigureOut">
               <a:rPr lang="LID4096" smtClean="0"/>
-              <a:t>09/08/2024</a:t>
+              <a:t>12/11/2025</a:t>
             </a:fld>
             <a:endParaRPr lang="LID4096"/>
           </a:p>
@@ -2987,7 +2987,7 @@
         </p:nvSpPr>
         <p:spPr>
           <a:xfrm>
-            <a:off x="-396665" y="1327522"/>
+            <a:off x="-196640" y="1327522"/>
             <a:ext cx="8491648" cy="4696222"/>
           </a:xfrm>
           <a:prstGeom prst="rect">
@@ -3010,7 +3010,7 @@
                 <a:ea typeface="Misans" pitchFamily="2" charset="-122"/>
                 <a:cs typeface="Misans" pitchFamily="2" charset="-122"/>
               </a:rPr>
-              <a:t>中文</a:t>
+              <a:t>简中</a:t>
             </a:r>
             <a:endParaRPr lang="LID4096" sz="29917" dirty="0">
               <a:solidFill>

</xml_diff>